<commit_message>
Changed contents to better reflect previous planning documents.
</commit_message>
<xml_diff>
--- a/Documents/Salesforce Intro.pptx
+++ b/Documents/Salesforce Intro.pptx
@@ -5,15 +5,15 @@
     <p:sldMasterId id="2147483660" r:id="rId1"/>
   </p:sldMasterIdLst>
   <p:notesMasterIdLst>
-    <p:notesMasterId r:id="rId14"/>
+    <p:notesMasterId r:id="rId15"/>
   </p:notesMasterIdLst>
   <p:handoutMasterIdLst>
-    <p:handoutMasterId r:id="rId15"/>
+    <p:handoutMasterId r:id="rId16"/>
   </p:handoutMasterIdLst>
   <p:sldIdLst>
     <p:sldId id="256" r:id="rId2"/>
     <p:sldId id="257" r:id="rId3"/>
-    <p:sldId id="258" r:id="rId4"/>
+    <p:sldId id="268" r:id="rId4"/>
     <p:sldId id="260" r:id="rId5"/>
     <p:sldId id="259" r:id="rId6"/>
     <p:sldId id="261" r:id="rId7"/>
@@ -22,7 +22,8 @@
     <p:sldId id="264" r:id="rId10"/>
     <p:sldId id="265" r:id="rId11"/>
     <p:sldId id="266" r:id="rId12"/>
-    <p:sldId id="267" r:id="rId13"/>
+    <p:sldId id="269" r:id="rId13"/>
+    <p:sldId id="270" r:id="rId14"/>
   </p:sldIdLst>
   <p:sldSz cx="12192000" cy="6858000"/>
   <p:notesSz cx="6858000" cy="9144000"/>
@@ -128,7 +129,7 @@
           <p14:sldIdLst>
             <p14:sldId id="256"/>
             <p14:sldId id="257"/>
-            <p14:sldId id="258"/>
+            <p14:sldId id="268"/>
             <p14:sldId id="260"/>
             <p14:sldId id="259"/>
           </p14:sldIdLst>
@@ -153,10 +154,17 @@
           <p14:sldIdLst>
             <p14:sldId id="265"/>
             <p14:sldId id="266"/>
-            <p14:sldId id="267"/>
+            <p14:sldId id="269"/>
+            <p14:sldId id="270"/>
           </p14:sldIdLst>
         </p14:section>
       </p14:sectionLst>
+    </p:ext>
+    <p:ext uri="{EFAFB233-063F-42B5-8137-9DF3F51BA10A}">
+      <p15:sldGuideLst xmlns:p15="http://schemas.microsoft.com/office/powerpoint/2012/main"/>
+    </p:ext>
+    <p:ext uri="{2D200454-40CA-4A62-9FC3-DE9A4176ACB9}">
+      <p15:notesGuideLst xmlns:p15="http://schemas.microsoft.com/office/powerpoint/2012/main"/>
     </p:ext>
   </p:extLst>
 </p:presentation>
@@ -172,20 +180,6 @@
     </p:extLst>
   </p:cmAuthor>
 </p:cmAuthorLst>
-</file>
-
-<file path=ppt/comments/comment1.xml><?xml version="1.0" encoding="utf-8"?>
-<p:cmLst xmlns:a="http://schemas.openxmlformats.org/drawingml/2006/main" xmlns:r="http://schemas.openxmlformats.org/officeDocument/2006/relationships" xmlns:p="http://schemas.openxmlformats.org/presentationml/2006/main">
-  <p:cm authorId="1" dt="2018-10-07T12:49:29.845" idx="1">
-    <p:pos x="2749" y="2060"/>
-    <p:text>Need to decide on prize</p:text>
-    <p:extLst>
-      <p:ext uri="{C676402C-5697-4E1C-873F-D02D1690AC5C}">
-        <p15:threadingInfo xmlns:p15="http://schemas.microsoft.com/office/powerpoint/2012/main" timeZoneBias="-60"/>
-      </p:ext>
-    </p:extLst>
-  </p:cm>
-</p:cmLst>
 </file>
 
 <file path=ppt/handoutMasters/handoutMaster1.xml><?xml version="1.0" encoding="utf-8"?>
@@ -1004,7 +998,7 @@
           <a:p>
             <a:r>
               <a:rPr lang="en-GB" dirty="0"/>
-              <a:t>Get students to present their projects, Salesforce reps and Mike will give feedback</a:t>
+              <a:t>Get students to present their projects, Salesforce reps will give feedback</a:t>
             </a:r>
           </a:p>
         </p:txBody>
@@ -1111,33 +1105,29 @@
           <a:bodyPr/>
           <a:lstStyle/>
           <a:p>
+            <a:endParaRPr lang="en-GB" dirty="0"/>
+          </a:p>
+        </p:txBody>
+      </p:sp>
+      <p:sp>
+        <p:nvSpPr>
+          <p:cNvPr id="4" name="Header Placeholder 3"/>
+          <p:cNvSpPr>
+            <a:spLocks noGrp="1"/>
+          </p:cNvSpPr>
+          <p:nvPr>
+            <p:ph type="hdr" sz="quarter"/>
+          </p:nvPr>
+        </p:nvSpPr>
+        <p:spPr/>
+        <p:txBody>
+          <a:bodyPr/>
+          <a:lstStyle/>
+          <a:p>
             <a:r>
               <a:rPr lang="en-GB" dirty="0"/>
-              <a:t>After did you enjoy?, get feedback. Only if positive, pitch enrichment.</a:t>
-            </a:r>
-          </a:p>
-        </p:txBody>
-      </p:sp>
-      <p:sp>
-        <p:nvSpPr>
-          <p:cNvPr id="4" name="Header Placeholder 3"/>
-          <p:cNvSpPr>
-            <a:spLocks noGrp="1"/>
-          </p:cNvSpPr>
-          <p:nvPr>
-            <p:ph type="hdr" sz="quarter"/>
-          </p:nvPr>
-        </p:nvSpPr>
-        <p:spPr/>
-        <p:txBody>
-          <a:bodyPr/>
-          <a:lstStyle/>
-          <a:p>
-            <a:r>
-              <a:rPr lang="en-GB"/>
-              <a:t>9:00-9:20</a:t>
-            </a:r>
-            <a:endParaRPr lang="en-GB" dirty="0"/>
+              <a:t>14:40-15:40</a:t>
+            </a:r>
           </a:p>
         </p:txBody>
       </p:sp>
@@ -1167,7 +1157,113 @@
     </p:spTree>
     <p:extLst>
       <p:ext uri="{BB962C8B-B14F-4D97-AF65-F5344CB8AC3E}">
-        <p14:creationId xmlns:p14="http://schemas.microsoft.com/office/powerpoint/2010/main" val="3888688453"/>
+        <p14:creationId xmlns:p14="http://schemas.microsoft.com/office/powerpoint/2010/main" val="2573264128"/>
+      </p:ext>
+    </p:extLst>
+  </p:cSld>
+  <p:clrMapOvr>
+    <a:masterClrMapping/>
+  </p:clrMapOvr>
+</p:notes>
+</file>
+
+<file path=ppt/notesSlides/notesSlide13.xml><?xml version="1.0" encoding="utf-8"?>
+<p:notes xmlns:a="http://schemas.openxmlformats.org/drawingml/2006/main" xmlns:r="http://schemas.openxmlformats.org/officeDocument/2006/relationships" xmlns:p="http://schemas.openxmlformats.org/presentationml/2006/main">
+  <p:cSld>
+    <p:spTree>
+      <p:nvGrpSpPr>
+        <p:cNvPr id="1" name=""/>
+        <p:cNvGrpSpPr/>
+        <p:nvPr/>
+      </p:nvGrpSpPr>
+      <p:grpSpPr>
+        <a:xfrm>
+          <a:off x="0" y="0"/>
+          <a:ext cx="0" cy="0"/>
+          <a:chOff x="0" y="0"/>
+          <a:chExt cx="0" cy="0"/>
+        </a:xfrm>
+      </p:grpSpPr>
+      <p:sp>
+        <p:nvSpPr>
+          <p:cNvPr id="2" name="Slide Image Placeholder 1"/>
+          <p:cNvSpPr>
+            <a:spLocks noGrp="1" noRot="1" noChangeAspect="1"/>
+          </p:cNvSpPr>
+          <p:nvPr>
+            <p:ph type="sldImg"/>
+          </p:nvPr>
+        </p:nvSpPr>
+        <p:spPr/>
+      </p:sp>
+      <p:sp>
+        <p:nvSpPr>
+          <p:cNvPr id="3" name="Notes Placeholder 2"/>
+          <p:cNvSpPr>
+            <a:spLocks noGrp="1"/>
+          </p:cNvSpPr>
+          <p:nvPr>
+            <p:ph type="body" idx="1"/>
+          </p:nvPr>
+        </p:nvSpPr>
+        <p:spPr/>
+        <p:txBody>
+          <a:bodyPr/>
+          <a:lstStyle/>
+          <a:p>
+            <a:endParaRPr lang="en-GB" dirty="0"/>
+          </a:p>
+        </p:txBody>
+      </p:sp>
+      <p:sp>
+        <p:nvSpPr>
+          <p:cNvPr id="4" name="Header Placeholder 3"/>
+          <p:cNvSpPr>
+            <a:spLocks noGrp="1"/>
+          </p:cNvSpPr>
+          <p:nvPr>
+            <p:ph type="hdr" sz="quarter"/>
+          </p:nvPr>
+        </p:nvSpPr>
+        <p:spPr/>
+        <p:txBody>
+          <a:bodyPr/>
+          <a:lstStyle/>
+          <a:p>
+            <a:r>
+              <a:rPr lang="en-GB" dirty="0"/>
+              <a:t>14:40-15:40</a:t>
+            </a:r>
+          </a:p>
+        </p:txBody>
+      </p:sp>
+      <p:sp>
+        <p:nvSpPr>
+          <p:cNvPr id="5" name="Slide Number Placeholder 4"/>
+          <p:cNvSpPr>
+            <a:spLocks noGrp="1"/>
+          </p:cNvSpPr>
+          <p:nvPr>
+            <p:ph type="sldNum" sz="quarter" idx="5"/>
+          </p:nvPr>
+        </p:nvSpPr>
+        <p:spPr/>
+        <p:txBody>
+          <a:bodyPr/>
+          <a:lstStyle/>
+          <a:p>
+            <a:fld id="{0546AA60-E781-4134-8935-0BF7D01390F3}" type="slidenum">
+              <a:rPr lang="en-GB" smtClean="0"/>
+              <a:t>13</a:t>
+            </a:fld>
+            <a:endParaRPr lang="en-GB"/>
+          </a:p>
+        </p:txBody>
+      </p:sp>
+    </p:spTree>
+    <p:extLst>
+      <p:ext uri="{BB962C8B-B14F-4D97-AF65-F5344CB8AC3E}">
+        <p14:creationId xmlns:p14="http://schemas.microsoft.com/office/powerpoint/2010/main" val="4269469579"/>
       </p:ext>
     </p:extLst>
   </p:cSld>
@@ -1339,7 +1435,7 @@
           <a:p>
             <a:r>
               <a:rPr lang="en-GB" dirty="0"/>
-              <a:t>Get them to set up a developer account. This means they can sign up to Trailblazer too.</a:t>
+              <a:t>Introduce to trailhead get them to signup with the Salesforce accounts they just created.</a:t>
             </a:r>
           </a:p>
         </p:txBody>
@@ -1372,7 +1468,7 @@
           <p:cNvPr id="5" name="Header Placeholder 4">
             <a:extLst>
               <a:ext uri="{FF2B5EF4-FFF2-40B4-BE49-F238E27FC236}">
-                <a16:creationId xmlns:a16="http://schemas.microsoft.com/office/drawing/2014/main" id="{ECF9B8E7-48F7-4791-912D-2242C046D18A}"/>
+                <a16:creationId xmlns:a16="http://schemas.microsoft.com/office/drawing/2014/main" id="{5E589C3E-A0B1-40EF-9534-AADC09B1EC81}"/>
               </a:ext>
             </a:extLst>
           </p:cNvPr>
@@ -1398,7 +1494,7 @@
     </p:spTree>
     <p:extLst>
       <p:ext uri="{BB962C8B-B14F-4D97-AF65-F5344CB8AC3E}">
-        <p14:creationId xmlns:p14="http://schemas.microsoft.com/office/powerpoint/2010/main" val="1112363397"/>
+        <p14:creationId xmlns:p14="http://schemas.microsoft.com/office/powerpoint/2010/main" val="780019688"/>
       </p:ext>
     </p:extLst>
   </p:cSld>
@@ -2287,9 +2383,7 @@
           </a:prstGeom>
           <a:ln w="76200">
             <a:solidFill>
-              <a:schemeClr val="bg2">
-                <a:lumMod val="10000"/>
-              </a:schemeClr>
+              <a:schemeClr val="bg1"/>
             </a:solidFill>
           </a:ln>
         </p:spPr>
@@ -2847,7 +2941,7 @@
           <a:p>
             <a:fld id="{833E5FB0-65AD-4CD0-B89D-5FDD260A85F4}" type="datetimeFigureOut">
               <a:rPr lang="en-GB" smtClean="0"/>
-              <a:t>06/10/2018</a:t>
+              <a:t>07/10/2018</a:t>
             </a:fld>
             <a:endParaRPr lang="en-GB"/>
           </a:p>
@@ -3119,7 +3213,7 @@
           <a:p>
             <a:fld id="{833E5FB0-65AD-4CD0-B89D-5FDD260A85F4}" type="datetimeFigureOut">
               <a:rPr lang="en-GB" smtClean="0"/>
-              <a:t>06/10/2018</a:t>
+              <a:t>07/10/2018</a:t>
             </a:fld>
             <a:endParaRPr lang="en-GB"/>
           </a:p>
@@ -3645,13 +3739,13 @@
           <a:p>
             <a:r>
               <a:rPr lang="en-GB" dirty="0"/>
-              <a:t>Continue with your projects, from before lunch</a:t>
+              <a:t>Continue with your projects from before lunch.</a:t>
             </a:r>
           </a:p>
           <a:p>
             <a:r>
               <a:rPr lang="en-GB" dirty="0"/>
-              <a:t>You have until 14:40 to finish</a:t>
+              <a:t>You will be presenting at 2:40PM</a:t>
             </a:r>
           </a:p>
         </p:txBody>
@@ -3717,31 +3811,6 @@
           </a:p>
         </p:txBody>
       </p:sp>
-      <p:sp>
-        <p:nvSpPr>
-          <p:cNvPr id="5" name="Text Placeholder 4">
-            <a:extLst>
-              <a:ext uri="{FF2B5EF4-FFF2-40B4-BE49-F238E27FC236}">
-                <a16:creationId xmlns:a16="http://schemas.microsoft.com/office/drawing/2014/main" id="{7ECCD58D-042D-42D1-BDB4-63B898CA9A94}"/>
-              </a:ext>
-            </a:extLst>
-          </p:cNvPr>
-          <p:cNvSpPr>
-            <a:spLocks noGrp="1"/>
-          </p:cNvSpPr>
-          <p:nvPr>
-            <p:ph type="body" idx="1"/>
-          </p:nvPr>
-        </p:nvSpPr>
-        <p:spPr/>
-        <p:txBody>
-          <a:bodyPr/>
-          <a:lstStyle/>
-          <a:p>
-            <a:endParaRPr lang="en-GB" dirty="0"/>
-          </a:p>
-        </p:txBody>
-      </p:sp>
     </p:spTree>
     <p:extLst>
       <p:ext uri="{BB962C8B-B14F-4D97-AF65-F5344CB8AC3E}">
@@ -3780,7 +3849,7 @@
           <p:cNvPr id="2" name="Title 1">
             <a:extLst>
               <a:ext uri="{FF2B5EF4-FFF2-40B4-BE49-F238E27FC236}">
-                <a16:creationId xmlns:a16="http://schemas.microsoft.com/office/drawing/2014/main" id="{D3473509-9523-4B65-A34E-9BCC70E83DC0}"/>
+                <a16:creationId xmlns:a16="http://schemas.microsoft.com/office/drawing/2014/main" id="{22540330-A128-4182-A6CE-624FDD70591A}"/>
               </a:ext>
             </a:extLst>
           </p:cNvPr>
@@ -3803,44 +3872,10 @@
           </a:p>
         </p:txBody>
       </p:sp>
-      <p:sp>
-        <p:nvSpPr>
-          <p:cNvPr id="3" name="Content Placeholder 2">
-            <a:extLst>
-              <a:ext uri="{FF2B5EF4-FFF2-40B4-BE49-F238E27FC236}">
-                <a16:creationId xmlns:a16="http://schemas.microsoft.com/office/drawing/2014/main" id="{28354309-C2F4-4570-A4AB-1FE6E5571240}"/>
-              </a:ext>
-            </a:extLst>
-          </p:cNvPr>
-          <p:cNvSpPr>
-            <a:spLocks noGrp="1"/>
-          </p:cNvSpPr>
-          <p:nvPr>
-            <p:ph idx="1"/>
-          </p:nvPr>
-        </p:nvSpPr>
-        <p:spPr/>
-        <p:txBody>
-          <a:bodyPr/>
-          <a:lstStyle/>
-          <a:p>
-            <a:r>
-              <a:rPr lang="en-GB" dirty="0"/>
-              <a:t>Did you enjoy today?</a:t>
-            </a:r>
-          </a:p>
-          <a:p>
-            <a:r>
-              <a:rPr lang="en-GB" dirty="0"/>
-              <a:t>Enrichment every Thursday.</a:t>
-            </a:r>
-          </a:p>
-        </p:txBody>
-      </p:sp>
     </p:spTree>
     <p:extLst>
       <p:ext uri="{BB962C8B-B14F-4D97-AF65-F5344CB8AC3E}">
-        <p14:creationId xmlns:p14="http://schemas.microsoft.com/office/powerpoint/2010/main" val="4032341865"/>
+        <p14:creationId xmlns:p14="http://schemas.microsoft.com/office/powerpoint/2010/main" val="2129567950"/>
       </p:ext>
     </p:extLst>
   </p:cSld>
@@ -3850,245 +3885,67 @@
   <p:transition>
     <p:push dir="u"/>
   </p:transition>
-  <p:timing>
-    <p:tnLst>
-      <p:par>
-        <p:cTn id="1" dur="indefinite" restart="never" nodeType="tmRoot">
-          <p:childTnLst>
-            <p:seq concurrent="1" nextAc="seek">
-              <p:cTn id="2" dur="indefinite" nodeType="mainSeq">
-                <p:childTnLst>
-                  <p:par>
-                    <p:cTn id="3" fill="hold">
-                      <p:stCondLst>
-                        <p:cond delay="indefinite"/>
-                      </p:stCondLst>
-                      <p:childTnLst>
-                        <p:par>
-                          <p:cTn id="4" fill="hold">
-                            <p:stCondLst>
-                              <p:cond delay="0"/>
-                            </p:stCondLst>
-                            <p:childTnLst>
-                              <p:par>
-                                <p:cTn id="5" presetID="2" presetClass="entr" presetSubtype="4" fill="hold" grpId="0" nodeType="clickEffect">
-                                  <p:stCondLst>
-                                    <p:cond delay="0"/>
-                                  </p:stCondLst>
-                                  <p:childTnLst>
-                                    <p:set>
-                                      <p:cBhvr>
-                                        <p:cTn id="6" dur="1" fill="hold">
-                                          <p:stCondLst>
-                                            <p:cond delay="0"/>
-                                          </p:stCondLst>
-                                        </p:cTn>
-                                        <p:tgtEl>
-                                          <p:spTgt spid="3">
-                                            <p:txEl>
-                                              <p:pRg st="0" end="0"/>
-                                            </p:txEl>
-                                          </p:spTgt>
-                                        </p:tgtEl>
-                                        <p:attrNameLst>
-                                          <p:attrName>style.visibility</p:attrName>
-                                        </p:attrNameLst>
-                                      </p:cBhvr>
-                                      <p:to>
-                                        <p:strVal val="visible"/>
-                                      </p:to>
-                                    </p:set>
-                                    <p:anim calcmode="lin" valueType="num">
-                                      <p:cBhvr additive="base">
-                                        <p:cTn id="7" dur="500" fill="hold"/>
-                                        <p:tgtEl>
-                                          <p:spTgt spid="3">
-                                            <p:txEl>
-                                              <p:pRg st="0" end="0"/>
-                                            </p:txEl>
-                                          </p:spTgt>
-                                        </p:tgtEl>
-                                        <p:attrNameLst>
-                                          <p:attrName>ppt_x</p:attrName>
-                                        </p:attrNameLst>
-                                      </p:cBhvr>
-                                      <p:tavLst>
-                                        <p:tav tm="0">
-                                          <p:val>
-                                            <p:strVal val="#ppt_x"/>
-                                          </p:val>
-                                        </p:tav>
-                                        <p:tav tm="100000">
-                                          <p:val>
-                                            <p:strVal val="#ppt_x"/>
-                                          </p:val>
-                                        </p:tav>
-                                      </p:tavLst>
-                                    </p:anim>
-                                    <p:anim calcmode="lin" valueType="num">
-                                      <p:cBhvr additive="base">
-                                        <p:cTn id="8" dur="500" fill="hold"/>
-                                        <p:tgtEl>
-                                          <p:spTgt spid="3">
-                                            <p:txEl>
-                                              <p:pRg st="0" end="0"/>
-                                            </p:txEl>
-                                          </p:spTgt>
-                                        </p:tgtEl>
-                                        <p:attrNameLst>
-                                          <p:attrName>ppt_y</p:attrName>
-                                        </p:attrNameLst>
-                                      </p:cBhvr>
-                                      <p:tavLst>
-                                        <p:tav tm="0">
-                                          <p:val>
-                                            <p:strVal val="1+#ppt_h/2"/>
-                                          </p:val>
-                                        </p:tav>
-                                        <p:tav tm="100000">
-                                          <p:val>
-                                            <p:strVal val="#ppt_y"/>
-                                          </p:val>
-                                        </p:tav>
-                                      </p:tavLst>
-                                    </p:anim>
-                                  </p:childTnLst>
-                                </p:cTn>
-                              </p:par>
-                            </p:childTnLst>
-                          </p:cTn>
-                        </p:par>
-                      </p:childTnLst>
-                    </p:cTn>
-                  </p:par>
-                  <p:par>
-                    <p:cTn id="9" fill="hold">
-                      <p:stCondLst>
-                        <p:cond delay="indefinite"/>
-                      </p:stCondLst>
-                      <p:childTnLst>
-                        <p:par>
-                          <p:cTn id="10" fill="hold">
-                            <p:stCondLst>
-                              <p:cond delay="0"/>
-                            </p:stCondLst>
-                            <p:childTnLst>
-                              <p:par>
-                                <p:cTn id="11" presetID="2" presetClass="entr" presetSubtype="4" fill="hold" grpId="0" nodeType="clickEffect">
-                                  <p:stCondLst>
-                                    <p:cond delay="0"/>
-                                  </p:stCondLst>
-                                  <p:childTnLst>
-                                    <p:set>
-                                      <p:cBhvr>
-                                        <p:cTn id="12" dur="1" fill="hold">
-                                          <p:stCondLst>
-                                            <p:cond delay="0"/>
-                                          </p:stCondLst>
-                                        </p:cTn>
-                                        <p:tgtEl>
-                                          <p:spTgt spid="3">
-                                            <p:txEl>
-                                              <p:pRg st="1" end="1"/>
-                                            </p:txEl>
-                                          </p:spTgt>
-                                        </p:tgtEl>
-                                        <p:attrNameLst>
-                                          <p:attrName>style.visibility</p:attrName>
-                                        </p:attrNameLst>
-                                      </p:cBhvr>
-                                      <p:to>
-                                        <p:strVal val="visible"/>
-                                      </p:to>
-                                    </p:set>
-                                    <p:anim calcmode="lin" valueType="num">
-                                      <p:cBhvr additive="base">
-                                        <p:cTn id="13" dur="500" fill="hold"/>
-                                        <p:tgtEl>
-                                          <p:spTgt spid="3">
-                                            <p:txEl>
-                                              <p:pRg st="1" end="1"/>
-                                            </p:txEl>
-                                          </p:spTgt>
-                                        </p:tgtEl>
-                                        <p:attrNameLst>
-                                          <p:attrName>ppt_x</p:attrName>
-                                        </p:attrNameLst>
-                                      </p:cBhvr>
-                                      <p:tavLst>
-                                        <p:tav tm="0">
-                                          <p:val>
-                                            <p:strVal val="#ppt_x"/>
-                                          </p:val>
-                                        </p:tav>
-                                        <p:tav tm="100000">
-                                          <p:val>
-                                            <p:strVal val="#ppt_x"/>
-                                          </p:val>
-                                        </p:tav>
-                                      </p:tavLst>
-                                    </p:anim>
-                                    <p:anim calcmode="lin" valueType="num">
-                                      <p:cBhvr additive="base">
-                                        <p:cTn id="14" dur="500" fill="hold"/>
-                                        <p:tgtEl>
-                                          <p:spTgt spid="3">
-                                            <p:txEl>
-                                              <p:pRg st="1" end="1"/>
-                                            </p:txEl>
-                                          </p:spTgt>
-                                        </p:tgtEl>
-                                        <p:attrNameLst>
-                                          <p:attrName>ppt_y</p:attrName>
-                                        </p:attrNameLst>
-                                      </p:cBhvr>
-                                      <p:tavLst>
-                                        <p:tav tm="0">
-                                          <p:val>
-                                            <p:strVal val="1+#ppt_h/2"/>
-                                          </p:val>
-                                        </p:tav>
-                                        <p:tav tm="100000">
-                                          <p:val>
-                                            <p:strVal val="#ppt_y"/>
-                                          </p:val>
-                                        </p:tav>
-                                      </p:tavLst>
-                                    </p:anim>
-                                  </p:childTnLst>
-                                </p:cTn>
-                              </p:par>
-                            </p:childTnLst>
-                          </p:cTn>
-                        </p:par>
-                      </p:childTnLst>
-                    </p:cTn>
-                  </p:par>
-                </p:childTnLst>
-              </p:cTn>
-              <p:prevCondLst>
-                <p:cond evt="onPrev" delay="0">
-                  <p:tgtEl>
-                    <p:sldTgt/>
-                  </p:tgtEl>
-                </p:cond>
-              </p:prevCondLst>
-              <p:nextCondLst>
-                <p:cond evt="onNext" delay="0">
-                  <p:tgtEl>
-                    <p:sldTgt/>
-                  </p:tgtEl>
-                </p:cond>
-              </p:nextCondLst>
-            </p:seq>
-          </p:childTnLst>
-        </p:cTn>
-      </p:par>
-    </p:tnLst>
-    <p:bldLst>
-      <p:bldP spid="3" grpId="0" build="p"/>
-    </p:bldLst>
-  </p:timing>
+</p:sld>
+</file>
+
+<file path=ppt/slides/slide13.xml><?xml version="1.0" encoding="utf-8"?>
+<p:sld xmlns:a="http://schemas.openxmlformats.org/drawingml/2006/main" xmlns:r="http://schemas.openxmlformats.org/officeDocument/2006/relationships" xmlns:p="http://schemas.openxmlformats.org/presentationml/2006/main">
+  <p:cSld>
+    <p:spTree>
+      <p:nvGrpSpPr>
+        <p:cNvPr id="1" name=""/>
+        <p:cNvGrpSpPr/>
+        <p:nvPr/>
+      </p:nvGrpSpPr>
+      <p:grpSpPr>
+        <a:xfrm>
+          <a:off x="0" y="0"/>
+          <a:ext cx="0" cy="0"/>
+          <a:chOff x="0" y="0"/>
+          <a:chExt cx="0" cy="0"/>
+        </a:xfrm>
+      </p:grpSpPr>
+      <p:sp>
+        <p:nvSpPr>
+          <p:cNvPr id="2" name="Title 1">
+            <a:extLst>
+              <a:ext uri="{FF2B5EF4-FFF2-40B4-BE49-F238E27FC236}">
+                <a16:creationId xmlns:a16="http://schemas.microsoft.com/office/drawing/2014/main" id="{22540330-A128-4182-A6CE-624FDD70591A}"/>
+              </a:ext>
+            </a:extLst>
+          </p:cNvPr>
+          <p:cNvSpPr>
+            <a:spLocks noGrp="1"/>
+          </p:cNvSpPr>
+          <p:nvPr>
+            <p:ph type="title"/>
+          </p:nvPr>
+        </p:nvSpPr>
+        <p:spPr/>
+        <p:txBody>
+          <a:bodyPr/>
+          <a:lstStyle/>
+          <a:p>
+            <a:r>
+              <a:rPr lang="en-GB" dirty="0"/>
+              <a:t>Feedback</a:t>
+            </a:r>
+          </a:p>
+        </p:txBody>
+      </p:sp>
+    </p:spTree>
+    <p:extLst>
+      <p:ext uri="{BB962C8B-B14F-4D97-AF65-F5344CB8AC3E}">
+        <p14:creationId xmlns:p14="http://schemas.microsoft.com/office/powerpoint/2010/main" val="1549057776"/>
+      </p:ext>
+    </p:extLst>
+  </p:cSld>
+  <p:clrMapOvr>
+    <a:masterClrMapping/>
+  </p:clrMapOvr>
+  <p:transition>
+    <p:push dir="u"/>
+  </p:transition>
 </p:sld>
 </file>
 
@@ -4209,7 +4066,7 @@
           <p:cNvPr id="2" name="Title 1">
             <a:extLst>
               <a:ext uri="{FF2B5EF4-FFF2-40B4-BE49-F238E27FC236}">
-                <a16:creationId xmlns:a16="http://schemas.microsoft.com/office/drawing/2014/main" id="{2163F9F1-5B63-421B-9235-5C968811A50C}"/>
+                <a16:creationId xmlns:a16="http://schemas.microsoft.com/office/drawing/2014/main" id="{174EF670-7A4D-42B2-B14F-D0F271E840C3}"/>
               </a:ext>
             </a:extLst>
           </p:cNvPr>
@@ -4237,7 +4094,7 @@
           <p:cNvPr id="3" name="Content Placeholder 2">
             <a:extLst>
               <a:ext uri="{FF2B5EF4-FFF2-40B4-BE49-F238E27FC236}">
-                <a16:creationId xmlns:a16="http://schemas.microsoft.com/office/drawing/2014/main" id="{3F93DD9F-0E63-4C05-BA00-CF2A01CA023D}"/>
+                <a16:creationId xmlns:a16="http://schemas.microsoft.com/office/drawing/2014/main" id="{5088675E-12E9-4070-9D13-AB51B634FD55}"/>
               </a:ext>
             </a:extLst>
           </p:cNvPr>
@@ -4250,39 +4107,30 @@
         </p:nvSpPr>
         <p:spPr/>
         <p:txBody>
-          <a:bodyPr/>
-          <a:lstStyle/>
-          <a:p>
-            <a:r>
-              <a:rPr lang="en-GB" dirty="0"/>
-              <a:t>Go to </a:t>
-            </a:r>
-            <a:r>
-              <a:rPr lang="en-GB" dirty="0">
+          <a:bodyPr anchor="ctr"/>
+          <a:lstStyle/>
+          <a:p>
+            <a:pPr marL="0" indent="0" algn="ctr">
+              <a:buNone/>
+            </a:pPr>
+            <a:r>
+              <a:rPr lang="en-GB" sz="4800" dirty="0"/>
+              <a:t>Sign up at </a:t>
+            </a:r>
+            <a:r>
+              <a:rPr lang="en-GB" sz="4800" dirty="0">
                 <a:hlinkClick r:id="rId3" action="ppaction://hlinkfile"/>
               </a:rPr>
               <a:t>developer.salesforce.com/signup</a:t>
             </a:r>
-            <a:endParaRPr lang="en-GB" dirty="0"/>
-          </a:p>
-          <a:p>
-            <a:r>
-              <a:rPr lang="en-GB" dirty="0"/>
-              <a:t>Signup.</a:t>
-            </a:r>
-          </a:p>
-          <a:p>
-            <a:r>
-              <a:rPr lang="en-GB" dirty="0"/>
-              <a:t>This will be useful later.</a:t>
-            </a:r>
+            <a:endParaRPr lang="en-GB" sz="4800" dirty="0"/>
           </a:p>
         </p:txBody>
       </p:sp>
     </p:spTree>
     <p:extLst>
       <p:ext uri="{BB962C8B-B14F-4D97-AF65-F5344CB8AC3E}">
-        <p14:creationId xmlns:p14="http://schemas.microsoft.com/office/powerpoint/2010/main" val="1359996142"/>
+        <p14:creationId xmlns:p14="http://schemas.microsoft.com/office/powerpoint/2010/main" val="1596613118"/>
       </p:ext>
     </p:extLst>
   </p:cSld>
@@ -4358,35 +4206,28 @@
         </p:nvSpPr>
         <p:spPr/>
         <p:txBody>
-          <a:bodyPr/>
-          <a:lstStyle/>
-          <a:p>
-            <a:r>
-              <a:rPr lang="en-GB" dirty="0"/>
-              <a:t>A way to show employers that you know how to use salesforce.</a:t>
-            </a:r>
-          </a:p>
-          <a:p>
-            <a:r>
-              <a:rPr lang="en-GB" dirty="0"/>
-              <a:t>Then go to </a:t>
-            </a:r>
-            <a:r>
-              <a:rPr lang="en-GB" dirty="0">
+          <a:bodyPr anchor="ctr"/>
+          <a:lstStyle/>
+          <a:p>
+            <a:pPr marL="0" indent="0" algn="ctr">
+              <a:buNone/>
+            </a:pPr>
+            <a:r>
+              <a:rPr lang="en-GB" sz="4800" dirty="0"/>
+              <a:t>Sign up at </a:t>
+            </a:r>
+          </a:p>
+          <a:p>
+            <a:pPr marL="0" indent="0" algn="ctr">
+              <a:buNone/>
+            </a:pPr>
+            <a:r>
+              <a:rPr lang="en-GB" sz="4800" dirty="0">
                 <a:hlinkClick r:id="rId3" action="ppaction://hlinkfile"/>
               </a:rPr>
               <a:t>trailhead.salesforce.com</a:t>
             </a:r>
-            <a:r>
-              <a:rPr lang="en-GB" dirty="0"/>
-              <a:t> </a:t>
-            </a:r>
-          </a:p>
-          <a:p>
-            <a:r>
-              <a:rPr lang="en-GB" dirty="0"/>
-              <a:t>Select “Sign up”</a:t>
-            </a:r>
+            <a:endParaRPr lang="en-GB" sz="4800" dirty="0"/>
           </a:p>
         </p:txBody>
       </p:sp>
@@ -4480,11 +4321,11 @@
           <a:p>
             <a:pPr lvl="1"/>
             <a:r>
-              <a:rPr lang="en-GB" sz="2800" u="sng" dirty="0" err="1"/>
+              <a:rPr lang="en-GB" sz="3200" u="sng" dirty="0"/>
               <a:t>Trailmixes</a:t>
             </a:r>
             <a:r>
-              <a:rPr lang="en-GB" sz="2800" u="sng" dirty="0"/>
+              <a:rPr lang="en-GB" u="sng" dirty="0"/>
               <a:t>:</a:t>
             </a:r>
           </a:p>
@@ -4492,25 +4333,29 @@
             <a:pPr lvl="2"/>
             <a:r>
               <a:rPr lang="en-GB" sz="2800" dirty="0"/>
-              <a:t>Student Groups Getting started </a:t>
-            </a:r>
-            <a:r>
-              <a:rPr lang="en-GB" sz="2800" dirty="0" err="1"/>
-              <a:t>Trailmix</a:t>
-            </a:r>
-            <a:endParaRPr lang="en-GB" sz="2800" dirty="0"/>
+              <a:t>Student Groups Getting started</a:t>
+            </a:r>
           </a:p>
           <a:p>
             <a:pPr lvl="2"/>
             <a:r>
               <a:rPr lang="en-GB" sz="2800" dirty="0"/>
-              <a:t>Student Groups Salesforce Basics </a:t>
-            </a:r>
-            <a:r>
-              <a:rPr lang="en-GB" sz="2800" dirty="0" err="1"/>
-              <a:t>Trailmix</a:t>
-            </a:r>
-            <a:endParaRPr lang="en-GB" sz="2800" dirty="0"/>
+              <a:t>Student Groups Salesforce Basics</a:t>
+            </a:r>
+          </a:p>
+          <a:p>
+            <a:pPr lvl="2"/>
+            <a:r>
+              <a:rPr lang="en-GB" sz="2800" dirty="0"/>
+              <a:t>Student Groups Soft Skills</a:t>
+            </a:r>
+          </a:p>
+          <a:p>
+            <a:pPr lvl="2"/>
+            <a:r>
+              <a:rPr lang="en-GB" sz="2800" dirty="0"/>
+              <a:t>Student Groups Hands-On Activities</a:t>
+            </a:r>
           </a:p>
           <a:p>
             <a:pPr lvl="1"/>
@@ -4714,7 +4559,7 @@
           <a:p>
             <a:r>
               <a:rPr lang="en-GB" dirty="0"/>
-              <a:t>Continue with what you were doing before break</a:t>
+              <a:t>Continue with your Trailmixes / </a:t>
             </a:r>
           </a:p>
           <a:p>
@@ -4732,14 +4577,9 @@
             </a:r>
           </a:p>
           <a:p>
-            <a:r>
-              <a:rPr lang="en-GB" dirty="0"/>
-              <a:t>Recommended</a:t>
-            </a:r>
-          </a:p>
-          <a:p>
-            <a:r>
-              <a:rPr lang="en-GB" u="sng" dirty="0" err="1"/>
+            <a:pPr lvl="1"/>
+            <a:r>
+              <a:rPr lang="en-GB" sz="3200" u="sng" dirty="0"/>
               <a:t>Trailmixes</a:t>
             </a:r>
             <a:r>
@@ -4748,44 +4588,49 @@
             </a:r>
           </a:p>
           <a:p>
+            <a:pPr lvl="2"/>
+            <a:r>
+              <a:rPr lang="en-GB" sz="2800" dirty="0"/>
+              <a:t>Student Groups Getting started</a:t>
+            </a:r>
+          </a:p>
+          <a:p>
+            <a:pPr lvl="2"/>
+            <a:r>
+              <a:rPr lang="en-GB" sz="2800" dirty="0"/>
+              <a:t>Student Groups Salesforce Basics</a:t>
+            </a:r>
+          </a:p>
+          <a:p>
+            <a:pPr lvl="2"/>
+            <a:r>
+              <a:rPr lang="en-GB" sz="2800" dirty="0"/>
+              <a:t>Student Groups Soft Skills</a:t>
+            </a:r>
+          </a:p>
+          <a:p>
+            <a:pPr lvl="2"/>
+            <a:r>
+              <a:rPr lang="en-GB" sz="2800" dirty="0"/>
+              <a:t>Student Groups Hands-On Activities</a:t>
+            </a:r>
+          </a:p>
+          <a:p>
             <a:pPr lvl="1"/>
             <a:r>
-              <a:rPr lang="en-GB" sz="2800" dirty="0"/>
-              <a:t>Student Groups Getting started </a:t>
-            </a:r>
-            <a:r>
-              <a:rPr lang="en-GB" sz="2800" dirty="0" err="1"/>
-              <a:t>Trailmix</a:t>
-            </a:r>
-            <a:endParaRPr lang="en-GB" sz="2800" dirty="0"/>
-          </a:p>
-          <a:p>
-            <a:pPr lvl="1"/>
-            <a:r>
-              <a:rPr lang="en-GB" sz="2800" dirty="0"/>
-              <a:t>Student Groups Salesforce Basics </a:t>
-            </a:r>
-            <a:r>
-              <a:rPr lang="en-GB" sz="2800" dirty="0" err="1"/>
-              <a:t>Trailmix</a:t>
-            </a:r>
-            <a:endParaRPr lang="en-GB" sz="2800" dirty="0"/>
-          </a:p>
-          <a:p>
-            <a:r>
-              <a:rPr lang="en-GB" u="sng" dirty="0"/>
+              <a:rPr lang="en-GB" sz="3200" u="sng" dirty="0"/>
               <a:t>Trails:</a:t>
             </a:r>
           </a:p>
           <a:p>
-            <a:pPr lvl="1"/>
+            <a:pPr lvl="2"/>
             <a:r>
               <a:rPr lang="en-GB" sz="2800" dirty="0"/>
               <a:t>Admin Beginner</a:t>
             </a:r>
           </a:p>
           <a:p>
-            <a:pPr lvl="1"/>
+            <a:pPr lvl="2"/>
             <a:r>
               <a:rPr lang="en-GB" sz="2800" dirty="0"/>
               <a:t>Developer Beginner</a:t>
@@ -4880,38 +4725,26 @@
           <a:p>
             <a:r>
               <a:rPr lang="en-GB" dirty="0"/>
-              <a:t>Get into groups</a:t>
+              <a:t>In groups, create a salesforce solution to be presented at 2:40PM.</a:t>
             </a:r>
           </a:p>
           <a:p>
             <a:r>
               <a:rPr lang="en-GB" dirty="0"/>
-              <a:t>Using one of the Development orgs we set up earlier</a:t>
+              <a:t>Pick a project from the suggestions sheet or come up with your own idea.</a:t>
             </a:r>
           </a:p>
           <a:p>
             <a:r>
               <a:rPr lang="en-GB" dirty="0"/>
-              <a:t>Create the best Salesforce layout for an Estate agents</a:t>
+              <a:t>Feel free to use some of this time to learn more skills via Trailmixes or Trails.</a:t>
             </a:r>
           </a:p>
           <a:p>
             <a:r>
               <a:rPr lang="en-GB" dirty="0"/>
-              <a:t>Best one wins a prize.</a:t>
-            </a:r>
-          </a:p>
-          <a:p>
-            <a:r>
-              <a:rPr lang="en-GB" dirty="0"/>
-              <a:t>Required: Property object, Customer object, Stage Kanban</a:t>
-            </a:r>
-          </a:p>
-          <a:p>
-            <a:endParaRPr lang="en-GB" dirty="0"/>
-          </a:p>
-          <a:p>
-            <a:endParaRPr lang="en-GB" dirty="0"/>
+              <a:t>Use the development org you setup earlier to collaborate.</a:t>
+            </a:r>
           </a:p>
         </p:txBody>
       </p:sp>
@@ -5319,109 +5152,6 @@
                                           <p:spTgt spid="3">
                                             <p:txEl>
                                               <p:pRg st="3" end="3"/>
-                                            </p:txEl>
-                                          </p:spTgt>
-                                        </p:tgtEl>
-                                        <p:attrNameLst>
-                                          <p:attrName>ppt_y</p:attrName>
-                                        </p:attrNameLst>
-                                      </p:cBhvr>
-                                      <p:tavLst>
-                                        <p:tav tm="0">
-                                          <p:val>
-                                            <p:strVal val="1+#ppt_h/2"/>
-                                          </p:val>
-                                        </p:tav>
-                                        <p:tav tm="100000">
-                                          <p:val>
-                                            <p:strVal val="#ppt_y"/>
-                                          </p:val>
-                                        </p:tav>
-                                      </p:tavLst>
-                                    </p:anim>
-                                  </p:childTnLst>
-                                </p:cTn>
-                              </p:par>
-                            </p:childTnLst>
-                          </p:cTn>
-                        </p:par>
-                      </p:childTnLst>
-                    </p:cTn>
-                  </p:par>
-                  <p:par>
-                    <p:cTn id="27" fill="hold">
-                      <p:stCondLst>
-                        <p:cond delay="indefinite"/>
-                      </p:stCondLst>
-                      <p:childTnLst>
-                        <p:par>
-                          <p:cTn id="28" fill="hold">
-                            <p:stCondLst>
-                              <p:cond delay="0"/>
-                            </p:stCondLst>
-                            <p:childTnLst>
-                              <p:par>
-                                <p:cTn id="29" presetID="2" presetClass="entr" presetSubtype="4" fill="hold" grpId="0" nodeType="clickEffect">
-                                  <p:stCondLst>
-                                    <p:cond delay="0"/>
-                                  </p:stCondLst>
-                                  <p:childTnLst>
-                                    <p:set>
-                                      <p:cBhvr>
-                                        <p:cTn id="30" dur="1" fill="hold">
-                                          <p:stCondLst>
-                                            <p:cond delay="0"/>
-                                          </p:stCondLst>
-                                        </p:cTn>
-                                        <p:tgtEl>
-                                          <p:spTgt spid="3">
-                                            <p:txEl>
-                                              <p:pRg st="4" end="4"/>
-                                            </p:txEl>
-                                          </p:spTgt>
-                                        </p:tgtEl>
-                                        <p:attrNameLst>
-                                          <p:attrName>style.visibility</p:attrName>
-                                        </p:attrNameLst>
-                                      </p:cBhvr>
-                                      <p:to>
-                                        <p:strVal val="visible"/>
-                                      </p:to>
-                                    </p:set>
-                                    <p:anim calcmode="lin" valueType="num">
-                                      <p:cBhvr additive="base">
-                                        <p:cTn id="31" dur="500" fill="hold"/>
-                                        <p:tgtEl>
-                                          <p:spTgt spid="3">
-                                            <p:txEl>
-                                              <p:pRg st="4" end="4"/>
-                                            </p:txEl>
-                                          </p:spTgt>
-                                        </p:tgtEl>
-                                        <p:attrNameLst>
-                                          <p:attrName>ppt_x</p:attrName>
-                                        </p:attrNameLst>
-                                      </p:cBhvr>
-                                      <p:tavLst>
-                                        <p:tav tm="0">
-                                          <p:val>
-                                            <p:strVal val="#ppt_x"/>
-                                          </p:val>
-                                        </p:tav>
-                                        <p:tav tm="100000">
-                                          <p:val>
-                                            <p:strVal val="#ppt_x"/>
-                                          </p:val>
-                                        </p:tav>
-                                      </p:tavLst>
-                                    </p:anim>
-                                    <p:anim calcmode="lin" valueType="num">
-                                      <p:cBhvr additive="base">
-                                        <p:cTn id="32" dur="500" fill="hold"/>
-                                        <p:tgtEl>
-                                          <p:spTgt spid="3">
-                                            <p:txEl>
-                                              <p:pRg st="4" end="4"/>
                                             </p:txEl>
                                           </p:spTgt>
                                         </p:tgtEl>

</xml_diff>

<commit_message>
Change colour of divider
</commit_message>
<xml_diff>
--- a/Documents/Salesforce Intro.pptx
+++ b/Documents/Salesforce Intro.pptx
@@ -11,7 +11,7 @@
     <p:handoutMasterId r:id="rId16"/>
   </p:handoutMasterIdLst>
   <p:sldIdLst>
-    <p:sldId id="256" r:id="rId2"/>
+    <p:sldId id="271" r:id="rId2"/>
     <p:sldId id="257" r:id="rId3"/>
     <p:sldId id="268" r:id="rId4"/>
     <p:sldId id="260" r:id="rId5"/>
@@ -127,7 +127,7 @@
       <p14:sectionLst xmlns:p14="http://schemas.microsoft.com/office/powerpoint/2010/main">
         <p14:section name="Introduction" id="{43DBC04A-DD84-46A8-9EB7-D23E4E9B84EB}">
           <p14:sldIdLst>
-            <p14:sldId id="256"/>
+            <p14:sldId id="271"/>
             <p14:sldId id="257"/>
             <p14:sldId id="268"/>
             <p14:sldId id="260"/>
@@ -279,7 +279,7 @@
           <a:p>
             <a:fld id="{D0A4CDC9-3A0A-4FBF-8B80-DE3E24C6FDB4}" type="datetimeFigureOut">
               <a:rPr lang="en-GB" smtClean="0"/>
-              <a:t>07/10/2018</a:t>
+              <a:t>09/10/2018</a:t>
             </a:fld>
             <a:endParaRPr lang="en-GB"/>
           </a:p>
@@ -461,7 +461,7 @@
           <a:p>
             <a:fld id="{B1FEF0B7-5C22-4510-9221-A81B1C9A75A5}" type="datetimeFigureOut">
               <a:rPr lang="en-GB" smtClean="0"/>
-              <a:t>07/10/2018</a:t>
+              <a:t>09/10/2018</a:t>
             </a:fld>
             <a:endParaRPr lang="en-GB"/>
           </a:p>
@@ -796,11 +796,71 @@
           <a:bodyPr/>
           <a:lstStyle/>
           <a:p>
+            <a:pPr marL="0" marR="0" lvl="0" indent="0" algn="r" defTabSz="914400" rtl="0" eaLnBrk="1" fontAlgn="auto" latinLnBrk="0" hangingPunct="1">
+              <a:lnSpc>
+                <a:spcPct val="100000"/>
+              </a:lnSpc>
+              <a:spcBef>
+                <a:spcPts val="0"/>
+              </a:spcBef>
+              <a:spcAft>
+                <a:spcPts val="0"/>
+              </a:spcAft>
+              <a:buClrTx/>
+              <a:buSzTx/>
+              <a:buFontTx/>
+              <a:buNone/>
+              <a:tabLst/>
+              <a:defRPr/>
+            </a:pPr>
             <a:fld id="{0546AA60-E781-4134-8935-0BF7D01390F3}" type="slidenum">
-              <a:rPr lang="en-GB" smtClean="0"/>
+              <a:rPr kumimoji="0" lang="en-GB" sz="1200" b="0" i="0" u="none" strike="noStrike" kern="1200" cap="none" spc="0" normalizeH="0" baseline="0" noProof="0" smtClean="0">
+                <a:ln>
+                  <a:noFill/>
+                </a:ln>
+                <a:solidFill>
+                  <a:prstClr val="black"/>
+                </a:solidFill>
+                <a:effectLst/>
+                <a:uLnTx/>
+                <a:uFillTx/>
+                <a:latin typeface="Calibri" panose="020F0502020204030204"/>
+                <a:ea typeface="+mn-ea"/>
+                <a:cs typeface="+mn-cs"/>
+              </a:rPr>
+              <a:pPr marL="0" marR="0" lvl="0" indent="0" algn="r" defTabSz="914400" rtl="0" eaLnBrk="1" fontAlgn="auto" latinLnBrk="0" hangingPunct="1">
+                <a:lnSpc>
+                  <a:spcPct val="100000"/>
+                </a:lnSpc>
+                <a:spcBef>
+                  <a:spcPts val="0"/>
+                </a:spcBef>
+                <a:spcAft>
+                  <a:spcPts val="0"/>
+                </a:spcAft>
+                <a:buClrTx/>
+                <a:buSzTx/>
+                <a:buFontTx/>
+                <a:buNone/>
+                <a:tabLst/>
+                <a:defRPr/>
+              </a:pPr>
               <a:t>1</a:t>
             </a:fld>
-            <a:endParaRPr lang="en-GB"/>
+            <a:endParaRPr kumimoji="0" lang="en-GB" sz="1200" b="0" i="0" u="none" strike="noStrike" kern="1200" cap="none" spc="0" normalizeH="0" baseline="0" noProof="0">
+              <a:ln>
+                <a:noFill/>
+              </a:ln>
+              <a:solidFill>
+                <a:prstClr val="black"/>
+              </a:solidFill>
+              <a:effectLst/>
+              <a:uLnTx/>
+              <a:uFillTx/>
+              <a:latin typeface="Calibri" panose="020F0502020204030204"/>
+              <a:ea typeface="+mn-ea"/>
+              <a:cs typeface="+mn-cs"/>
+            </a:endParaRPr>
           </a:p>
         </p:txBody>
       </p:sp>
@@ -825,18 +885,61 @@
           <a:bodyPr/>
           <a:lstStyle/>
           <a:p>
-            <a:r>
-              <a:rPr lang="en-GB"/>
+            <a:pPr marL="0" marR="0" lvl="0" indent="0" algn="l" defTabSz="914400" rtl="0" eaLnBrk="1" fontAlgn="auto" latinLnBrk="0" hangingPunct="1">
+              <a:lnSpc>
+                <a:spcPct val="100000"/>
+              </a:lnSpc>
+              <a:spcBef>
+                <a:spcPts val="0"/>
+              </a:spcBef>
+              <a:spcAft>
+                <a:spcPts val="0"/>
+              </a:spcAft>
+              <a:buClrTx/>
+              <a:buSzTx/>
+              <a:buFontTx/>
+              <a:buNone/>
+              <a:tabLst/>
+              <a:defRPr/>
+            </a:pPr>
+            <a:r>
+              <a:rPr kumimoji="0" lang="en-GB" sz="1200" b="0" i="0" u="none" strike="noStrike" kern="1200" cap="none" spc="0" normalizeH="0" baseline="0" noProof="0">
+                <a:ln>
+                  <a:noFill/>
+                </a:ln>
+                <a:solidFill>
+                  <a:prstClr val="black"/>
+                </a:solidFill>
+                <a:effectLst/>
+                <a:uLnTx/>
+                <a:uFillTx/>
+                <a:latin typeface="Calibri" panose="020F0502020204030204"/>
+                <a:ea typeface="+mn-ea"/>
+                <a:cs typeface="+mn-cs"/>
+              </a:rPr>
               <a:t>9:00-9:20</a:t>
             </a:r>
-            <a:endParaRPr lang="en-GB" dirty="0"/>
+            <a:endParaRPr kumimoji="0" lang="en-GB" sz="1200" b="0" i="0" u="none" strike="noStrike" kern="1200" cap="none" spc="0" normalizeH="0" baseline="0" noProof="0" dirty="0">
+              <a:ln>
+                <a:noFill/>
+              </a:ln>
+              <a:solidFill>
+                <a:prstClr val="black"/>
+              </a:solidFill>
+              <a:effectLst/>
+              <a:uLnTx/>
+              <a:uFillTx/>
+              <a:latin typeface="Calibri" panose="020F0502020204030204"/>
+              <a:ea typeface="+mn-ea"/>
+              <a:cs typeface="+mn-cs"/>
+            </a:endParaRPr>
           </a:p>
         </p:txBody>
       </p:sp>
     </p:spTree>
     <p:extLst>
       <p:ext uri="{BB962C8B-B14F-4D97-AF65-F5344CB8AC3E}">
-        <p14:creationId xmlns:p14="http://schemas.microsoft.com/office/powerpoint/2010/main" val="383259559"/>
+        <p14:creationId xmlns:p14="http://schemas.microsoft.com/office/powerpoint/2010/main" val="3437196418"/>
       </p:ext>
     </p:extLst>
   </p:cSld>
@@ -2383,7 +2486,9 @@
           </a:prstGeom>
           <a:ln w="76200">
             <a:solidFill>
-              <a:schemeClr val="bg1"/>
+              <a:schemeClr val="bg2">
+                <a:lumMod val="10000"/>
+              </a:schemeClr>
             </a:solidFill>
           </a:ln>
         </p:spPr>
@@ -2941,7 +3046,7 @@
           <a:p>
             <a:fld id="{833E5FB0-65AD-4CD0-B89D-5FDD260A85F4}" type="datetimeFigureOut">
               <a:rPr lang="en-GB" smtClean="0"/>
-              <a:t>07/10/2018</a:t>
+              <a:t>09/10/2018</a:t>
             </a:fld>
             <a:endParaRPr lang="en-GB"/>
           </a:p>
@@ -3213,7 +3318,7 @@
           <a:p>
             <a:fld id="{833E5FB0-65AD-4CD0-B89D-5FDD260A85F4}" type="datetimeFigureOut">
               <a:rPr lang="en-GB" smtClean="0"/>
-              <a:t>07/10/2018</a:t>
+              <a:t>09/10/2018</a:t>
             </a:fld>
             <a:endParaRPr lang="en-GB"/>
           </a:p>
@@ -3658,7 +3763,7 @@
     </p:spTree>
     <p:extLst>
       <p:ext uri="{BB962C8B-B14F-4D97-AF65-F5344CB8AC3E}">
-        <p14:creationId xmlns:p14="http://schemas.microsoft.com/office/powerpoint/2010/main" val="1368549489"/>
+        <p14:creationId xmlns:p14="http://schemas.microsoft.com/office/powerpoint/2010/main" val="2499670334"/>
       </p:ext>
     </p:extLst>
   </p:cSld>

</xml_diff>